<commit_message>
Enhance model equation slides with better visual formatting
- Create dedicated create_equation_slide() function for prominent equation display
- Display main equation in large red bold text (32pt)
- Add variable definitions (Where, β₀, β_i, Factor_i, ε)
- Show model info (parameter count, model type, response variable)
- Improved visual hierarchy and readability
- Both full and reduced models now have properly formatted equation slides
</commit_message>
<xml_diff>
--- a/outputs/doe_analysis_reduced.pptx
+++ b/outputs/doe_analysis_reduced.pptx
@@ -5670,8 +5670,8 @@
         </p:nvSpPr>
         <p:spPr>
           <a:xfrm>
-            <a:off x="640080" y="1280160"/>
-            <a:ext cx="7863840" cy="4754880"/>
+            <a:off x="640080" y="1371600"/>
+            <a:ext cx="7863840" cy="1371600"/>
           </a:xfrm>
           <a:prstGeom prst="rect">
             <a:avLst/>
@@ -5684,54 +5684,133 @@
           </a:bodyPr>
           <a:lstStyle/>
           <a:p>
+            <a:pPr algn="ctr">
+              <a:defRPr sz="3200" b="1">
+                <a:solidFill>
+                  <a:srgbClr val="C00000"/>
+                </a:solidFill>
+              </a:defRPr>
+            </a:pPr>
+            <a:r>
+              <a:t>Interface_Temp = β₀ + Σ(β_i × Factor_i) + ε</a:t>
+            </a:r>
+          </a:p>
+        </p:txBody>
+      </p:sp>
+      <p:sp>
+        <p:nvSpPr>
+          <p:cNvPr id="5" name="TextBox 4"/>
+          <p:cNvSpPr txBox="1"/>
+          <p:nvPr/>
+        </p:nvSpPr>
+        <p:spPr>
+          <a:xfrm>
+            <a:off x="640080" y="2926080"/>
+            <a:ext cx="7863840" cy="2286000"/>
+          </a:xfrm>
+          <a:prstGeom prst="rect">
+            <a:avLst/>
+          </a:prstGeom>
+          <a:noFill/>
+        </p:spPr>
+        <p:txBody>
+          <a:bodyPr wrap="square">
+            <a:spAutoFit/>
+          </a:bodyPr>
+          <a:lstStyle/>
+          <a:p>
             <a:pPr>
-              <a:defRPr sz="1600"/>
+              <a:defRPr sz="1800">
+                <a:solidFill>
+                  <a:srgbClr val="323232"/>
+                </a:solidFill>
+              </a:defRPr>
             </a:pPr>
             <a:r>
-              <a:t>Model Equation (Reduced):</a:t>
-            </a:r>
-            <a:br/>
-            <a:br/>
-            <a:r>
-              <a:t>Interface_Temp = β₀ + Σ(β_i × Factor_i) + ε</a:t>
-            </a:r>
-            <a:br/>
-            <a:br/>
-            <a:r>
               <a:t>Where:</a:t>
             </a:r>
-            <a:br/>
+          </a:p>
+          <a:p>
+            <a:pPr>
+              <a:defRPr sz="1800">
+                <a:solidFill>
+                  <a:srgbClr val="323232"/>
+                </a:solidFill>
+              </a:defRPr>
+            </a:pPr>
             <a:r>
               <a:t>• β₀ = Intercept</a:t>
             </a:r>
-            <a:br/>
-            <a:r>
-              <a:t>• β_i = Parameter coefficients (non-significant terms removed)</a:t>
-            </a:r>
-            <a:br/>
+          </a:p>
+          <a:p>
+            <a:pPr>
+              <a:defRPr sz="1800">
+                <a:solidFill>
+                  <a:srgbClr val="323232"/>
+                </a:solidFill>
+              </a:defRPr>
+            </a:pPr>
+            <a:r>
+              <a:t>• β_i = Parameter coefficients</a:t>
+            </a:r>
+          </a:p>
+          <a:p>
+            <a:pPr>
+              <a:defRPr sz="1800">
+                <a:solidFill>
+                  <a:srgbClr val="323232"/>
+                </a:solidFill>
+              </a:defRPr>
+            </a:pPr>
             <a:r>
               <a:t>• Factor_i = Design factors (Transceiver, Fan Speed, Rack Unit)</a:t>
             </a:r>
-            <a:br/>
+          </a:p>
+          <a:p>
+            <a:pPr>
+              <a:defRPr sz="1800">
+                <a:solidFill>
+                  <a:srgbClr val="323232"/>
+                </a:solidFill>
+              </a:defRPr>
+            </a:pPr>
             <a:r>
               <a:t>• ε = Random error term</a:t>
             </a:r>
-            <a:br/>
-            <a:br/>
-            <a:r>
-              <a:t>Reduced Model: 451 parameters (-45% from full model)</a:t>
-            </a:r>
-            <a:br/>
-            <a:r>
-              <a:t>Model Type: Multiple Linear Regression</a:t>
-            </a:r>
-            <a:br/>
-            <a:r>
-              <a:t>Response Variable: Interface_Temp</a:t>
-            </a:r>
-            <a:br/>
-            <a:r>
-              <a:t>        </a:t>
+          </a:p>
+        </p:txBody>
+      </p:sp>
+      <p:sp>
+        <p:nvSpPr>
+          <p:cNvPr id="6" name="TextBox 5"/>
+          <p:cNvSpPr txBox="1"/>
+          <p:nvPr/>
+        </p:nvSpPr>
+        <p:spPr>
+          <a:xfrm>
+            <a:off x="640080" y="5394960"/>
+            <a:ext cx="7863840" cy="1097280"/>
+          </a:xfrm>
+          <a:prstGeom prst="rect">
+            <a:avLst/>
+          </a:prstGeom>
+          <a:noFill/>
+        </p:spPr>
+        <p:txBody>
+          <a:bodyPr wrap="square">
+            <a:spAutoFit/>
+          </a:bodyPr>
+          <a:lstStyle/>
+          <a:p>
+            <a:pPr algn="ctr">
+              <a:defRPr sz="1400">
+                <a:solidFill>
+                  <a:srgbClr val="646464"/>
+                </a:solidFill>
+              </a:defRPr>
+            </a:pPr>
+            <a:r>
+              <a:t>Reduced Model: 451 parameters (-45%) | Model Type: Multiple Linear Regression | Response: Interface_Temp</a:t>
             </a:r>
           </a:p>
         </p:txBody>

</xml_diff>